<commit_message>
Adding Qualitative questions answers.
</commit_message>
<xml_diff>
--- a/Project Review and Feedback/IDS6916 Group4 Project Review and Feedback.pptx
+++ b/Project Review and Feedback/IDS6916 Group4 Project Review and Feedback.pptx
@@ -249,6 +249,53 @@
 
 <file path=ppt/changesInfos/changesInfo1.xml><?xml version="1.0" encoding="utf-8"?>
 <pc:chgInfo xmlns:a="http://schemas.openxmlformats.org/drawingml/2006/main" xmlns:r="http://schemas.openxmlformats.org/officeDocument/2006/relationships" xmlns:ac="http://schemas.microsoft.com/office/drawing/2013/main/command" xmlns:pc="http://schemas.microsoft.com/office/powerpoint/2013/main/command">
+  <pc:docChgLst>
+    <pc:chgData name="Ugur Uysal" userId="d57be18797cc43e3" providerId="LiveId" clId="{7E7B835C-EA99-4EA0-B4B0-2ED24A47DB32}"/>
+    <pc:docChg chg="undo redo custSel addSld delSld modSld">
+      <pc:chgData name="Ugur Uysal" userId="d57be18797cc43e3" providerId="LiveId" clId="{7E7B835C-EA99-4EA0-B4B0-2ED24A47DB32}" dt="2018-08-01T23:34:10.928" v="1144" actId="1036"/>
+      <pc:docMkLst>
+        <pc:docMk/>
+      </pc:docMkLst>
+      <pc:sldChg chg="modSp">
+        <pc:chgData name="Ugur Uysal" userId="d57be18797cc43e3" providerId="LiveId" clId="{7E7B835C-EA99-4EA0-B4B0-2ED24A47DB32}" dt="2018-08-01T02:57:30.456" v="1052" actId="1076"/>
+        <pc:sldMkLst>
+          <pc:docMk/>
+          <pc:sldMk cId="0" sldId="256"/>
+        </pc:sldMkLst>
+        <pc:spChg chg="mod">
+          <ac:chgData name="Ugur Uysal" userId="d57be18797cc43e3" providerId="LiveId" clId="{7E7B835C-EA99-4EA0-B4B0-2ED24A47DB32}" dt="2018-07-31T18:45:46.193" v="38" actId="255"/>
+          <ac:spMkLst>
+            <pc:docMk/>
+            <pc:sldMk cId="0" sldId="256"/>
+            <ac:spMk id="127" creationId="{00000000-0000-0000-0000-000000000000}"/>
+          </ac:spMkLst>
+        </pc:spChg>
+        <pc:spChg chg="mod">
+          <ac:chgData name="Ugur Uysal" userId="d57be18797cc43e3" providerId="LiveId" clId="{7E7B835C-EA99-4EA0-B4B0-2ED24A47DB32}" dt="2018-08-01T02:57:30.456" v="1052" actId="1076"/>
+          <ac:spMkLst>
+            <pc:docMk/>
+            <pc:sldMk cId="0" sldId="256"/>
+            <ac:spMk id="128" creationId="{00000000-0000-0000-0000-000000000000}"/>
+          </ac:spMkLst>
+        </pc:spChg>
+      </pc:sldChg>
+      <pc:sldChg chg="modSp">
+        <pc:chgData name="Ugur Uysal" userId="d57be18797cc43e3" providerId="LiveId" clId="{7E7B835C-EA99-4EA0-B4B0-2ED24A47DB32}" dt="2018-08-01T23:32:03.304" v="1124" actId="113"/>
+        <pc:sldMkLst>
+          <pc:docMk/>
+          <pc:sldMk cId="0" sldId="285"/>
+        </pc:sldMkLst>
+        <pc:spChg chg="mod">
+          <ac:chgData name="Ugur Uysal" userId="d57be18797cc43e3" providerId="LiveId" clId="{7E7B835C-EA99-4EA0-B4B0-2ED24A47DB32}" dt="2018-08-01T23:32:03.304" v="1124" actId="113"/>
+          <ac:spMkLst>
+            <pc:docMk/>
+            <pc:sldMk cId="0" sldId="285"/>
+            <ac:spMk id="337" creationId="{00000000-0000-0000-0000-000000000000}"/>
+          </ac:spMkLst>
+        </pc:spChg>
+      </pc:sldChg>
+    </pc:docChg>
+  </pc:docChgLst>
   <pc:docChgLst>
     <pc:chgData name="Ugur Uysal" userId="d57be18797cc43e3" providerId="LiveId" clId="{8ED045D8-9BAF-4B29-BFFA-66364395C8DD}"/>
     <pc:docChg chg="undo custSel addSld delSld modSld sldOrd">
@@ -780,53 +827,6 @@
     </pc:docChg>
   </pc:docChgLst>
   <pc:docChgLst>
-    <pc:chgData name="Ugur Uysal" userId="d57be18797cc43e3" providerId="LiveId" clId="{7E7B835C-EA99-4EA0-B4B0-2ED24A47DB32}"/>
-    <pc:docChg chg="undo redo custSel addSld delSld modSld">
-      <pc:chgData name="Ugur Uysal" userId="d57be18797cc43e3" providerId="LiveId" clId="{7E7B835C-EA99-4EA0-B4B0-2ED24A47DB32}" dt="2018-08-01T23:34:10.928" v="1144" actId="1036"/>
-      <pc:docMkLst>
-        <pc:docMk/>
-      </pc:docMkLst>
-      <pc:sldChg chg="modSp">
-        <pc:chgData name="Ugur Uysal" userId="d57be18797cc43e3" providerId="LiveId" clId="{7E7B835C-EA99-4EA0-B4B0-2ED24A47DB32}" dt="2018-08-01T02:57:30.456" v="1052" actId="1076"/>
-        <pc:sldMkLst>
-          <pc:docMk/>
-          <pc:sldMk cId="0" sldId="256"/>
-        </pc:sldMkLst>
-        <pc:spChg chg="mod">
-          <ac:chgData name="Ugur Uysal" userId="d57be18797cc43e3" providerId="LiveId" clId="{7E7B835C-EA99-4EA0-B4B0-2ED24A47DB32}" dt="2018-07-31T18:45:46.193" v="38" actId="255"/>
-          <ac:spMkLst>
-            <pc:docMk/>
-            <pc:sldMk cId="0" sldId="256"/>
-            <ac:spMk id="127" creationId="{00000000-0000-0000-0000-000000000000}"/>
-          </ac:spMkLst>
-        </pc:spChg>
-        <pc:spChg chg="mod">
-          <ac:chgData name="Ugur Uysal" userId="d57be18797cc43e3" providerId="LiveId" clId="{7E7B835C-EA99-4EA0-B4B0-2ED24A47DB32}" dt="2018-08-01T02:57:30.456" v="1052" actId="1076"/>
-          <ac:spMkLst>
-            <pc:docMk/>
-            <pc:sldMk cId="0" sldId="256"/>
-            <ac:spMk id="128" creationId="{00000000-0000-0000-0000-000000000000}"/>
-          </ac:spMkLst>
-        </pc:spChg>
-      </pc:sldChg>
-      <pc:sldChg chg="modSp">
-        <pc:chgData name="Ugur Uysal" userId="d57be18797cc43e3" providerId="LiveId" clId="{7E7B835C-EA99-4EA0-B4B0-2ED24A47DB32}" dt="2018-08-01T23:32:03.304" v="1124" actId="113"/>
-        <pc:sldMkLst>
-          <pc:docMk/>
-          <pc:sldMk cId="0" sldId="285"/>
-        </pc:sldMkLst>
-        <pc:spChg chg="mod">
-          <ac:chgData name="Ugur Uysal" userId="d57be18797cc43e3" providerId="LiveId" clId="{7E7B835C-EA99-4EA0-B4B0-2ED24A47DB32}" dt="2018-08-01T23:32:03.304" v="1124" actId="113"/>
-          <ac:spMkLst>
-            <pc:docMk/>
-            <pc:sldMk cId="0" sldId="285"/>
-            <ac:spMk id="337" creationId="{00000000-0000-0000-0000-000000000000}"/>
-          </ac:spMkLst>
-        </pc:spChg>
-      </pc:sldChg>
-    </pc:docChg>
-  </pc:docChgLst>
-  <pc:docChgLst>
     <pc:chgData name="Ugur Uysal" userId="d57be18797cc43e3" providerId="LiveId" clId="{833C4B0E-B579-40B9-B7EF-0B8BB4FA1189}"/>
   </pc:docChgLst>
 </pc:chgInfo>
@@ -1768,7 +1768,7 @@
                 <a:cs typeface="Times"/>
                 <a:sym typeface="Times"/>
               </a:rPr>
-              <a:t>‹Nr.›</a:t>
+              <a:t>‹#›</a:t>
             </a:fld>
             <a:endParaRPr sz="1200" b="0" i="0" u="none" strike="noStrike" cap="none">
               <a:solidFill>
@@ -4861,7 +4861,7 @@
                 <a:cs typeface="Times"/>
                 <a:sym typeface="Times"/>
               </a:rPr>
-              <a:t>‹Nr.›</a:t>
+              <a:t>‹#›</a:t>
             </a:fld>
             <a:endParaRPr sz="1400">
               <a:solidFill>
@@ -5796,7 +5796,7 @@
                 <a:cs typeface="Times"/>
                 <a:sym typeface="Times"/>
               </a:rPr>
-              <a:t>‹Nr.›</a:t>
+              <a:t>‹#›</a:t>
             </a:fld>
             <a:endParaRPr sz="1400">
               <a:solidFill>
@@ -7209,7 +7209,7 @@
                 <a:cs typeface="Times"/>
                 <a:sym typeface="Times"/>
               </a:rPr>
-              <a:t>‹Nr.›</a:t>
+              <a:t>‹#›</a:t>
             </a:fld>
             <a:endParaRPr sz="1400">
               <a:solidFill>
@@ -8861,7 +8861,7 @@
                 <a:cs typeface="Times"/>
                 <a:sym typeface="Times"/>
               </a:rPr>
-              <a:t>‹Nr.›</a:t>
+              <a:t>‹#›</a:t>
             </a:fld>
             <a:endParaRPr sz="1400">
               <a:solidFill>
@@ -10274,7 +10274,7 @@
                 <a:cs typeface="Times"/>
                 <a:sym typeface="Times"/>
               </a:rPr>
-              <a:t>‹Nr.›</a:t>
+              <a:t>‹#›</a:t>
             </a:fld>
             <a:endParaRPr sz="1400">
               <a:solidFill>
@@ -10767,7 +10767,7 @@
                 <a:cs typeface="Times"/>
                 <a:sym typeface="Times"/>
               </a:rPr>
-              <a:t>‹Nr.›</a:t>
+              <a:t>‹#›</a:t>
             </a:fld>
             <a:endParaRPr sz="1400">
               <a:solidFill>
@@ -11702,7 +11702,7 @@
                 <a:cs typeface="Times"/>
                 <a:sym typeface="Times"/>
               </a:rPr>
-              <a:t>‹Nr.›</a:t>
+              <a:t>‹#›</a:t>
             </a:fld>
             <a:endParaRPr sz="1400">
               <a:solidFill>
@@ -12876,7 +12876,7 @@
                 <a:cs typeface="Times"/>
                 <a:sym typeface="Times"/>
               </a:rPr>
-              <a:t>‹Nr.›</a:t>
+              <a:t>‹#›</a:t>
             </a:fld>
             <a:endParaRPr sz="1400">
               <a:solidFill>
@@ -14528,7 +14528,7 @@
                 <a:cs typeface="Times"/>
                 <a:sym typeface="Times"/>
               </a:rPr>
-              <a:t>‹Nr.›</a:t>
+              <a:t>‹#›</a:t>
             </a:fld>
             <a:endParaRPr sz="1400">
               <a:solidFill>
@@ -15224,7 +15224,7 @@
                 <a:cs typeface="Times"/>
                 <a:sym typeface="Times"/>
               </a:rPr>
-              <a:t>‹Nr.›</a:t>
+              <a:t>‹#›</a:t>
             </a:fld>
             <a:endParaRPr sz="1400">
               <a:solidFill>
@@ -16398,7 +16398,7 @@
                 <a:cs typeface="Times"/>
                 <a:sym typeface="Times"/>
               </a:rPr>
-              <a:t>‹Nr.›</a:t>
+              <a:t>‹#›</a:t>
             </a:fld>
             <a:endParaRPr sz="1400">
               <a:solidFill>
@@ -17572,7 +17572,7 @@
                 <a:cs typeface="Times"/>
                 <a:sym typeface="Times"/>
               </a:rPr>
-              <a:t>‹Nr.›</a:t>
+              <a:t>‹#›</a:t>
             </a:fld>
             <a:endParaRPr sz="1400">
               <a:solidFill>
@@ -18507,7 +18507,7 @@
                 <a:cs typeface="Times"/>
                 <a:sym typeface="Times"/>
               </a:rPr>
-              <a:t>‹Nr.›</a:t>
+              <a:t>‹#›</a:t>
             </a:fld>
             <a:endParaRPr sz="1400">
               <a:solidFill>
@@ -19691,7 +19691,7 @@
                 <a:cs typeface="Times"/>
                 <a:sym typeface="Times"/>
               </a:rPr>
-              <a:t>‹Nr.›</a:t>
+              <a:t>‹#›</a:t>
             </a:fld>
             <a:endParaRPr sz="1400" b="0" u="none">
               <a:solidFill>
@@ -23959,9 +23959,18 @@
           </a:p>
           <a:p>
             <a:r>
-              <a:rPr lang="en-US" sz="2400" dirty="0"/>
-              <a:t>Answer</a:t>
+              <a:rPr lang="en-US" dirty="0"/>
+              <a:t>    The military is looking into increasing their capabilities star introducing unmanned vehicles (UVs) and robotic systems (Squire &amp; Parasuraman, 2010) (de Visser &amp; Parasuraman, 2011) (Chen &amp; Barnes 2014).  The factors driving the introduction of UVs to increase force lethality, survivor evacuation, and reducing human exposure to combat operations (Chen &amp; Barnes 2014).  Other factors are the reduction in personnel, reduction in labor cost, improve human safety and cost-saving ways to perform tasks without the human limitations and expense (Squire &amp; Parasuraman, 2010) (</a:t>
             </a:r>
+            <a:r>
+              <a:rPr lang="en-US" dirty="0" err="1"/>
+              <a:t>Endsley</a:t>
+            </a:r>
+            <a:r>
+              <a:rPr lang="en-US" dirty="0"/>
+              <a:t>, 2017).  The literature provides some evidence where the use of human-supervised autonomous has been beneficial.</a:t>
+            </a:r>
+            <a:endParaRPr lang="en-US" sz="2400" dirty="0"/>
           </a:p>
         </p:txBody>
       </p:sp>
@@ -24152,9 +24161,10 @@
           </a:p>
           <a:p>
             <a:r>
-              <a:rPr lang="en-US" sz="2400" dirty="0"/>
-              <a:t>answer</a:t>
+              <a:rPr lang="en-US" dirty="0"/>
+              <a:t>   Current research being performed on the subject of dismounted infantry working with small robots, intelligent analysis, human working with intelligent agents managing teams of unmanned vehicles, vehicles with ground penetrating radars (Chen, 2018).  Most of the research perform into the efficacy Some research perform in human-automation teaming is looking at the behavior and the synchronization between teams (Demir, McNeese, and Cooke, 2018).  There are a number of research being conducted in the field of human-autonomy systems.  Some of the research concentrate on the cognitive load of the human agent and how to decrease it.</a:t>
             </a:r>
+            <a:endParaRPr lang="en-US" sz="2400" dirty="0"/>
           </a:p>
         </p:txBody>
       </p:sp>
@@ -24345,9 +24355,26 @@
           </a:p>
           <a:p>
             <a:r>
-              <a:rPr lang="en-US" sz="2400" dirty="0"/>
-              <a:t>answer</a:t>
+              <a:rPr lang="en-US" dirty="0"/>
+              <a:t>   The suggestion for autonomous systems to ensure they adhered to legal implication is to rest the authority on a human supervisor (Chen &amp; Barnes 2014). Humans still understand patterns behavior, human intentions, macro implications and ethical responsibilities much better than artificial systems (Chen &amp; Barnes 2014). For this reason, the system autonomous agent shall always remain subordinate to their human counterparts (Chen &amp; Barnes 2014). The human will only be allowed the agent to act autonomously only specified conditions (Chen &amp; Barnes 2014). John H. Northrop and Associate conducted a study which suggests developing a matrix defining the level of automation (</a:t>
             </a:r>
+            <a:r>
+              <a:rPr lang="en-US" dirty="0" err="1"/>
+              <a:t>Chesebrough</a:t>
+            </a:r>
+            <a:r>
+              <a:rPr lang="en-US" dirty="0"/>
+              <a:t> &amp; Dooley, 2018).  This matrix should provide the need and level of autonomous tactical needed to accomplish the mission within the constraints of mission parameters (</a:t>
+            </a:r>
+            <a:r>
+              <a:rPr lang="en-US" dirty="0" err="1"/>
+              <a:t>Chesebrough</a:t>
+            </a:r>
+            <a:r>
+              <a:rPr lang="en-US" dirty="0"/>
+              <a:t> &amp; Dooley, 2018). The literature has provided a number of solutions to integrate rules of engagement, ethical and legal tenants.</a:t>
+            </a:r>
+            <a:endParaRPr lang="en-US" sz="2400" dirty="0"/>
           </a:p>
         </p:txBody>
       </p:sp>

</xml_diff>